<commit_message>
Moved sections around in PDP protocol chapter. Added PDP stream example stream graphic. Modified PDP packet diagram to fit discussion. Added text to Stream Decoding section.
</commit_message>
<xml_diff>
--- a/fig/packet_chart.pptx
+++ b/fig/packet_chart.pptx
@@ -104,6 +104,11 @@
       </a:defRPr>
     </a:lvl9pPr>
   </p:defaultTextStyle>
+  <p:extLst>
+    <p:ext uri="{EFAFB233-063F-42B5-8137-9DF3F51BA10A}">
+      <p15:sldGuideLst xmlns:p15="http://schemas.microsoft.com/office/powerpoint/2012/main"/>
+    </p:ext>
+  </p:extLst>
 </p:presentation>
 </file>
 
@@ -254,7 +259,7 @@
           <a:p>
             <a:fld id="{012D987B-3F95-46E4-B87E-037AD464ADB9}" type="datetimeFigureOut">
               <a:rPr lang="en-US" smtClean="0"/>
-              <a:t>10/26/2020</a:t>
+              <a:t>10/28/2020</a:t>
             </a:fld>
             <a:endParaRPr lang="en-US"/>
           </a:p>
@@ -452,7 +457,7 @@
           <a:p>
             <a:fld id="{012D987B-3F95-46E4-B87E-037AD464ADB9}" type="datetimeFigureOut">
               <a:rPr lang="en-US" smtClean="0"/>
-              <a:t>10/26/2020</a:t>
+              <a:t>10/28/2020</a:t>
             </a:fld>
             <a:endParaRPr lang="en-US"/>
           </a:p>
@@ -660,7 +665,7 @@
           <a:p>
             <a:fld id="{012D987B-3F95-46E4-B87E-037AD464ADB9}" type="datetimeFigureOut">
               <a:rPr lang="en-US" smtClean="0"/>
-              <a:t>10/26/2020</a:t>
+              <a:t>10/28/2020</a:t>
             </a:fld>
             <a:endParaRPr lang="en-US"/>
           </a:p>
@@ -858,7 +863,7 @@
           <a:p>
             <a:fld id="{012D987B-3F95-46E4-B87E-037AD464ADB9}" type="datetimeFigureOut">
               <a:rPr lang="en-US" smtClean="0"/>
-              <a:t>10/26/2020</a:t>
+              <a:t>10/28/2020</a:t>
             </a:fld>
             <a:endParaRPr lang="en-US"/>
           </a:p>
@@ -1133,7 +1138,7 @@
           <a:p>
             <a:fld id="{012D987B-3F95-46E4-B87E-037AD464ADB9}" type="datetimeFigureOut">
               <a:rPr lang="en-US" smtClean="0"/>
-              <a:t>10/26/2020</a:t>
+              <a:t>10/28/2020</a:t>
             </a:fld>
             <a:endParaRPr lang="en-US"/>
           </a:p>
@@ -1398,7 +1403,7 @@
           <a:p>
             <a:fld id="{012D987B-3F95-46E4-B87E-037AD464ADB9}" type="datetimeFigureOut">
               <a:rPr lang="en-US" smtClean="0"/>
-              <a:t>10/26/2020</a:t>
+              <a:t>10/28/2020</a:t>
             </a:fld>
             <a:endParaRPr lang="en-US"/>
           </a:p>
@@ -1810,7 +1815,7 @@
           <a:p>
             <a:fld id="{012D987B-3F95-46E4-B87E-037AD464ADB9}" type="datetimeFigureOut">
               <a:rPr lang="en-US" smtClean="0"/>
-              <a:t>10/26/2020</a:t>
+              <a:t>10/28/2020</a:t>
             </a:fld>
             <a:endParaRPr lang="en-US"/>
           </a:p>
@@ -1951,7 +1956,7 @@
           <a:p>
             <a:fld id="{012D987B-3F95-46E4-B87E-037AD464ADB9}" type="datetimeFigureOut">
               <a:rPr lang="en-US" smtClean="0"/>
-              <a:t>10/26/2020</a:t>
+              <a:t>10/28/2020</a:t>
             </a:fld>
             <a:endParaRPr lang="en-US"/>
           </a:p>
@@ -2064,7 +2069,7 @@
           <a:p>
             <a:fld id="{012D987B-3F95-46E4-B87E-037AD464ADB9}" type="datetimeFigureOut">
               <a:rPr lang="en-US" smtClean="0"/>
-              <a:t>10/26/2020</a:t>
+              <a:t>10/28/2020</a:t>
             </a:fld>
             <a:endParaRPr lang="en-US"/>
           </a:p>
@@ -2375,7 +2380,7 @@
           <a:p>
             <a:fld id="{012D987B-3F95-46E4-B87E-037AD464ADB9}" type="datetimeFigureOut">
               <a:rPr lang="en-US" smtClean="0"/>
-              <a:t>10/26/2020</a:t>
+              <a:t>10/28/2020</a:t>
             </a:fld>
             <a:endParaRPr lang="en-US"/>
           </a:p>
@@ -2663,7 +2668,7 @@
           <a:p>
             <a:fld id="{012D987B-3F95-46E4-B87E-037AD464ADB9}" type="datetimeFigureOut">
               <a:rPr lang="en-US" smtClean="0"/>
-              <a:t>10/26/2020</a:t>
+              <a:t>10/28/2020</a:t>
             </a:fld>
             <a:endParaRPr lang="en-US"/>
           </a:p>
@@ -2904,7 +2909,7 @@
           <a:p>
             <a:fld id="{012D987B-3F95-46E4-B87E-037AD464ADB9}" type="datetimeFigureOut">
               <a:rPr lang="en-US" smtClean="0"/>
-              <a:t>10/26/2020</a:t>
+              <a:t>10/28/2020</a:t>
             </a:fld>
             <a:endParaRPr lang="en-US"/>
           </a:p>
@@ -3336,7 +3341,7 @@
           <p:nvPr>
             <p:extLst>
               <p:ext uri="{D42A27DB-BD31-4B8C-83A1-F6EECF244321}">
-                <p14:modId xmlns:p14="http://schemas.microsoft.com/office/powerpoint/2010/main" val="2901929093"/>
+                <p14:modId xmlns:p14="http://schemas.microsoft.com/office/powerpoint/2010/main" val="3751400979"/>
               </p:ext>
             </p:extLst>
           </p:nvPr>
@@ -3662,7 +3667,17 @@
                       <a:endParaRPr lang="en-US"/>
                     </a:p>
                   </a:txBody>
-                  <a:tcPr/>
+                  <a:tcPr>
+                    <a:lnL w="12700" cap="flat" cmpd="sng" algn="ctr">
+                      <a:solidFill>
+                        <a:srgbClr val="666666"/>
+                      </a:solidFill>
+                      <a:prstDash val="solid"/>
+                      <a:round/>
+                      <a:headEnd type="none" w="med" len="med"/>
+                      <a:tailEnd type="none" w="med" len="med"/>
+                    </a:lnL>
+                  </a:tcPr>
                 </a:tc>
                 <a:tc hMerge="1">
                   <a:txBody>
@@ -3708,7 +3723,7 @@
                         </a:spcAft>
                       </a:pPr>
                       <a:r>
-                        <a:rPr lang="en-US" sz="1100" b="1">
+                        <a:rPr lang="en-US" sz="1100" b="1" dirty="0">
                           <a:solidFill>
                             <a:srgbClr val="000000"/>
                           </a:solidFill>
@@ -3717,9 +3732,9 @@
                           <a:ea typeface="Times New Roman" panose="02020603050405020304" pitchFamily="18" charset="0"/>
                           <a:cs typeface="Times New Roman" panose="02020603050405020304" pitchFamily="18" charset="0"/>
                         </a:rPr>
-                        <a:t>From Stream</a:t>
+                        <a:t>No Operation</a:t>
                       </a:r>
-                      <a:endParaRPr lang="en-US" sz="1100">
+                      <a:endParaRPr lang="en-US" sz="1100" dirty="0">
                         <a:solidFill>
                           <a:srgbClr val="000000"/>
                         </a:solidFill>
@@ -3934,7 +3949,17 @@
                       <a:endParaRPr lang="en-US"/>
                     </a:p>
                   </a:txBody>
-                  <a:tcPr/>
+                  <a:tcPr>
+                    <a:lnL w="12700" cap="flat" cmpd="sng" algn="ctr">
+                      <a:solidFill>
+                        <a:srgbClr val="666666"/>
+                      </a:solidFill>
+                      <a:prstDash val="solid"/>
+                      <a:round/>
+                      <a:headEnd type="none" w="med" len="med"/>
+                      <a:tailEnd type="none" w="med" len="med"/>
+                    </a:lnL>
+                  </a:tcPr>
                 </a:tc>
                 <a:tc hMerge="1">
                   <a:txBody>
@@ -4309,15 +4334,6 @@
                       <a:headEnd type="none" w="med" len="med"/>
                       <a:tailEnd type="none" w="med" len="med"/>
                     </a:lnR>
-                    <a:lnT w="12700" cap="flat" cmpd="sng" algn="ctr">
-                      <a:solidFill>
-                        <a:srgbClr val="666666"/>
-                      </a:solidFill>
-                      <a:prstDash val="solid"/>
-                      <a:round/>
-                      <a:headEnd type="none" w="med" len="med"/>
-                      <a:tailEnd type="none" w="med" len="med"/>
-                    </a:lnT>
                     <a:lnB w="12700" cap="flat" cmpd="sng" algn="ctr">
                       <a:solidFill>
                         <a:srgbClr val="666666"/>
@@ -4363,15 +4379,6 @@
                     </a:p>
                   </a:txBody>
                   <a:tcPr marL="68580" marR="68580" marT="0" marB="0">
-                    <a:lnL w="12700" cap="flat" cmpd="sng" algn="ctr">
-                      <a:solidFill>
-                        <a:srgbClr val="666666"/>
-                      </a:solidFill>
-                      <a:prstDash val="solid"/>
-                      <a:round/>
-                      <a:headEnd type="none" w="med" len="med"/>
-                      <a:tailEnd type="none" w="med" len="med"/>
-                    </a:lnL>
                     <a:lnR w="12700" cap="flat" cmpd="sng" algn="ctr">
                       <a:solidFill>
                         <a:srgbClr val="666666"/>
@@ -4381,15 +4388,6 @@
                       <a:headEnd type="none" w="med" len="med"/>
                       <a:tailEnd type="none" w="med" len="med"/>
                     </a:lnR>
-                    <a:lnT w="12700" cap="flat" cmpd="sng" algn="ctr">
-                      <a:solidFill>
-                        <a:srgbClr val="666666"/>
-                      </a:solidFill>
-                      <a:prstDash val="solid"/>
-                      <a:round/>
-                      <a:headEnd type="none" w="med" len="med"/>
-                      <a:tailEnd type="none" w="med" len="med"/>
-                    </a:lnT>
                     <a:lnB w="12700" cap="flat" cmpd="sng" algn="ctr">
                       <a:solidFill>
                         <a:srgbClr val="666666"/>
@@ -4636,7 +4634,7 @@
                     </a:solidFill>
                   </a:tcPr>
                 </a:tc>
-                <a:tc gridSpan="5">
+                <a:tc>
                   <a:txBody>
                     <a:bodyPr/>
                     <a:lstStyle/>
@@ -4662,8 +4660,80 @@
                           <a:ea typeface="Times New Roman" panose="02020603050405020304" pitchFamily="18" charset="0"/>
                           <a:cs typeface="Times New Roman" panose="02020603050405020304" pitchFamily="18" charset="0"/>
                         </a:rPr>
-                        <a:t> </a:t>
+                        <a:t>Quad </a:t>
                       </a:r>
+                    </a:p>
+                  </a:txBody>
+                  <a:tcPr marL="68580" marR="68580" marT="0" marB="0">
+                    <a:lnL w="12700" cap="flat" cmpd="sng" algn="ctr">
+                      <a:solidFill>
+                        <a:srgbClr val="666666"/>
+                      </a:solidFill>
+                      <a:prstDash val="solid"/>
+                      <a:round/>
+                      <a:headEnd type="none" w="med" len="med"/>
+                      <a:tailEnd type="none" w="med" len="med"/>
+                    </a:lnL>
+                    <a:lnR w="12700" cap="flat" cmpd="sng" algn="ctr">
+                      <a:solidFill>
+                        <a:srgbClr val="666666"/>
+                      </a:solidFill>
+                      <a:prstDash val="solid"/>
+                      <a:round/>
+                      <a:headEnd type="none" w="med" len="med"/>
+                      <a:tailEnd type="none" w="med" len="med"/>
+                    </a:lnR>
+                    <a:lnT w="12700" cap="flat" cmpd="sng" algn="ctr">
+                      <a:solidFill>
+                        <a:srgbClr val="666666"/>
+                      </a:solidFill>
+                      <a:prstDash val="solid"/>
+                      <a:round/>
+                      <a:headEnd type="none" w="med" len="med"/>
+                      <a:tailEnd type="none" w="med" len="med"/>
+                    </a:lnT>
+                    <a:lnB w="12700" cap="flat" cmpd="sng" algn="ctr">
+                      <a:solidFill>
+                        <a:srgbClr val="666666"/>
+                      </a:solidFill>
+                      <a:prstDash val="solid"/>
+                      <a:round/>
+                      <a:headEnd type="none" w="med" len="med"/>
+                      <a:tailEnd type="none" w="med" len="med"/>
+                    </a:lnB>
+                    <a:solidFill>
+                      <a:schemeClr val="accent2">
+                        <a:lumMod val="20000"/>
+                        <a:lumOff val="80000"/>
+                      </a:schemeClr>
+                    </a:solidFill>
+                  </a:tcPr>
+                </a:tc>
+                <a:tc gridSpan="4">
+                  <a:txBody>
+                    <a:bodyPr/>
+                    <a:lstStyle/>
+                    <a:p>
+                      <a:pPr marL="0" marR="0" algn="ctr">
+                        <a:lnSpc>
+                          <a:spcPct val="105000"/>
+                        </a:lnSpc>
+                        <a:spcBef>
+                          <a:spcPts val="0"/>
+                        </a:spcBef>
+                        <a:spcAft>
+                          <a:spcPts val="0"/>
+                        </a:spcAft>
+                      </a:pPr>
+                      <a:endParaRPr lang="en-US" sz="1100" dirty="0">
+                        <a:solidFill>
+                          <a:srgbClr val="000000"/>
+                        </a:solidFill>
+                        <a:effectLst/>
+                        <a:latin typeface="Calibri" panose="020F0502020204030204" pitchFamily="34" charset="0"/>
+                        <a:ea typeface="Times New Roman" panose="02020603050405020304" pitchFamily="18" charset="0"/>
+                        <a:cs typeface="Times New Roman" panose="02020603050405020304" pitchFamily="18" charset="0"/>
+                      </a:endParaRPr>
                     </a:p>
                   </a:txBody>
                   <a:tcPr marL="68580" marR="68580" marT="0" marB="0">
@@ -4713,40 +4783,207 @@
                     <a:bodyPr/>
                     <a:lstStyle/>
                     <a:p>
-                      <a:endParaRPr lang="en-US"/>
+                      <a:pPr marL="0" marR="0" algn="ctr">
+                        <a:lnSpc>
+                          <a:spcPct val="105000"/>
+                        </a:lnSpc>
+                        <a:spcBef>
+                          <a:spcPts val="0"/>
+                        </a:spcBef>
+                        <a:spcAft>
+                          <a:spcPts val="0"/>
+                        </a:spcAft>
+                      </a:pPr>
+                      <a:endParaRPr lang="en-US" sz="1100" dirty="0">
+                        <a:solidFill>
+                          <a:srgbClr val="000000"/>
+                        </a:solidFill>
+                        <a:effectLst/>
+                        <a:latin typeface="Calibri" panose="020F0502020204030204" pitchFamily="34" charset="0"/>
+                        <a:ea typeface="Times New Roman" panose="02020603050405020304" pitchFamily="18" charset="0"/>
+                        <a:cs typeface="Times New Roman" panose="02020603050405020304" pitchFamily="18" charset="0"/>
+                      </a:endParaRPr>
                     </a:p>
                   </a:txBody>
-                  <a:tcPr/>
+                  <a:tcPr marL="68580" marR="68580" marT="0" marB="0">
+                    <a:lnL w="12700" cap="flat" cmpd="sng" algn="ctr">
+                      <a:solidFill>
+                        <a:srgbClr val="666666"/>
+                      </a:solidFill>
+                      <a:prstDash val="solid"/>
+                      <a:round/>
+                      <a:headEnd type="none" w="med" len="med"/>
+                      <a:tailEnd type="none" w="med" len="med"/>
+                    </a:lnL>
+                    <a:lnR w="12700" cap="flat" cmpd="sng" algn="ctr">
+                      <a:solidFill>
+                        <a:srgbClr val="666666"/>
+                      </a:solidFill>
+                      <a:prstDash val="solid"/>
+                      <a:round/>
+                      <a:headEnd type="none" w="med" len="med"/>
+                      <a:tailEnd type="none" w="med" len="med"/>
+                    </a:lnR>
+                    <a:lnT w="12700" cap="flat" cmpd="sng" algn="ctr">
+                      <a:solidFill>
+                        <a:srgbClr val="666666"/>
+                      </a:solidFill>
+                      <a:prstDash val="solid"/>
+                      <a:round/>
+                      <a:headEnd type="none" w="med" len="med"/>
+                      <a:tailEnd type="none" w="med" len="med"/>
+                    </a:lnT>
+                    <a:lnB w="12700" cap="flat" cmpd="sng" algn="ctr">
+                      <a:solidFill>
+                        <a:srgbClr val="666666"/>
+                      </a:solidFill>
+                      <a:prstDash val="solid"/>
+                      <a:round/>
+                      <a:headEnd type="none" w="med" len="med"/>
+                      <a:tailEnd type="none" w="med" len="med"/>
+                    </a:lnB>
+                    <a:solidFill>
+                      <a:srgbClr val="F2F2F2"/>
+                    </a:solidFill>
+                  </a:tcPr>
                 </a:tc>
                 <a:tc hMerge="1">
                   <a:txBody>
                     <a:bodyPr/>
                     <a:lstStyle/>
                     <a:p>
-                      <a:endParaRPr lang="en-US"/>
+                      <a:pPr marL="0" marR="0" algn="ctr">
+                        <a:lnSpc>
+                          <a:spcPct val="105000"/>
+                        </a:lnSpc>
+                        <a:spcBef>
+                          <a:spcPts val="0"/>
+                        </a:spcBef>
+                        <a:spcAft>
+                          <a:spcPts val="0"/>
+                        </a:spcAft>
+                      </a:pPr>
+                      <a:endParaRPr lang="en-US" sz="1100" dirty="0">
+                        <a:solidFill>
+                          <a:srgbClr val="000000"/>
+                        </a:solidFill>
+                        <a:effectLst/>
+                        <a:latin typeface="Calibri" panose="020F0502020204030204" pitchFamily="34" charset="0"/>
+                        <a:ea typeface="Times New Roman" panose="02020603050405020304" pitchFamily="18" charset="0"/>
+                        <a:cs typeface="Times New Roman" panose="02020603050405020304" pitchFamily="18" charset="0"/>
+                      </a:endParaRPr>
                     </a:p>
                   </a:txBody>
-                  <a:tcPr/>
+                  <a:tcPr marL="68580" marR="68580" marT="0" marB="0">
+                    <a:lnL w="12700" cap="flat" cmpd="sng" algn="ctr">
+                      <a:solidFill>
+                        <a:srgbClr val="666666"/>
+                      </a:solidFill>
+                      <a:prstDash val="solid"/>
+                      <a:round/>
+                      <a:headEnd type="none" w="med" len="med"/>
+                      <a:tailEnd type="none" w="med" len="med"/>
+                    </a:lnL>
+                    <a:lnR w="12700" cap="flat" cmpd="sng" algn="ctr">
+                      <a:solidFill>
+                        <a:srgbClr val="666666"/>
+                      </a:solidFill>
+                      <a:prstDash val="solid"/>
+                      <a:round/>
+                      <a:headEnd type="none" w="med" len="med"/>
+                      <a:tailEnd type="none" w="med" len="med"/>
+                    </a:lnR>
+                    <a:lnT w="12700" cap="flat" cmpd="sng" algn="ctr">
+                      <a:solidFill>
+                        <a:srgbClr val="666666"/>
+                      </a:solidFill>
+                      <a:prstDash val="solid"/>
+                      <a:round/>
+                      <a:headEnd type="none" w="med" len="med"/>
+                      <a:tailEnd type="none" w="med" len="med"/>
+                    </a:lnT>
+                    <a:lnB w="12700" cap="flat" cmpd="sng" algn="ctr">
+                      <a:solidFill>
+                        <a:srgbClr val="666666"/>
+                      </a:solidFill>
+                      <a:prstDash val="solid"/>
+                      <a:round/>
+                      <a:headEnd type="none" w="med" len="med"/>
+                      <a:tailEnd type="none" w="med" len="med"/>
+                    </a:lnB>
+                    <a:solidFill>
+                      <a:srgbClr val="F2F2F2"/>
+                    </a:solidFill>
+                  </a:tcPr>
                 </a:tc>
                 <a:tc hMerge="1">
                   <a:txBody>
                     <a:bodyPr/>
                     <a:lstStyle/>
                     <a:p>
-                      <a:endParaRPr lang="en-US"/>
+                      <a:pPr marL="0" marR="0" algn="ctr">
+                        <a:lnSpc>
+                          <a:spcPct val="105000"/>
+                        </a:lnSpc>
+                        <a:spcBef>
+                          <a:spcPts val="0"/>
+                        </a:spcBef>
+                        <a:spcAft>
+                          <a:spcPts val="0"/>
+                        </a:spcAft>
+                      </a:pPr>
+                      <a:endParaRPr lang="en-US" sz="1100" dirty="0">
+                        <a:solidFill>
+                          <a:srgbClr val="000000"/>
+                        </a:solidFill>
+                        <a:effectLst/>
+                        <a:latin typeface="Calibri" panose="020F0502020204030204" pitchFamily="34" charset="0"/>
+                        <a:ea typeface="Times New Roman" panose="02020603050405020304" pitchFamily="18" charset="0"/>
+                        <a:cs typeface="Times New Roman" panose="02020603050405020304" pitchFamily="18" charset="0"/>
+                      </a:endParaRPr>
                     </a:p>
                   </a:txBody>
-                  <a:tcPr/>
-                </a:tc>
-                <a:tc hMerge="1">
-                  <a:txBody>
-                    <a:bodyPr/>
-                    <a:lstStyle/>
-                    <a:p>
-                      <a:endParaRPr lang="en-US"/>
-                    </a:p>
-                  </a:txBody>
-                  <a:tcPr/>
+                  <a:tcPr marL="68580" marR="68580" marT="0" marB="0">
+                    <a:lnL w="12700" cap="flat" cmpd="sng" algn="ctr">
+                      <a:solidFill>
+                        <a:srgbClr val="666666"/>
+                      </a:solidFill>
+                      <a:prstDash val="solid"/>
+                      <a:round/>
+                      <a:headEnd type="none" w="med" len="med"/>
+                      <a:tailEnd type="none" w="med" len="med"/>
+                    </a:lnL>
+                    <a:lnR w="12700" cap="flat" cmpd="sng" algn="ctr">
+                      <a:solidFill>
+                        <a:srgbClr val="666666"/>
+                      </a:solidFill>
+                      <a:prstDash val="solid"/>
+                      <a:round/>
+                      <a:headEnd type="none" w="med" len="med"/>
+                      <a:tailEnd type="none" w="med" len="med"/>
+                    </a:lnR>
+                    <a:lnT w="12700" cap="flat" cmpd="sng" algn="ctr">
+                      <a:solidFill>
+                        <a:srgbClr val="666666"/>
+                      </a:solidFill>
+                      <a:prstDash val="solid"/>
+                      <a:round/>
+                      <a:headEnd type="none" w="med" len="med"/>
+                      <a:tailEnd type="none" w="med" len="med"/>
+                    </a:lnT>
+                    <a:lnB w="12700" cap="flat" cmpd="sng" algn="ctr">
+                      <a:solidFill>
+                        <a:srgbClr val="666666"/>
+                      </a:solidFill>
+                      <a:prstDash val="solid"/>
+                      <a:round/>
+                      <a:headEnd type="none" w="med" len="med"/>
+                      <a:tailEnd type="none" w="med" len="med"/>
+                    </a:lnB>
+                    <a:solidFill>
+                      <a:srgbClr val="F2F2F2"/>
+                    </a:solidFill>
+                  </a:tcPr>
                 </a:tc>
                 <a:extLst>
                   <a:ext uri="{0D108BD9-81ED-4DB2-BD59-A6C34878D82A}">
@@ -4772,7 +5009,7 @@
                         </a:spcAft>
                       </a:pPr>
                       <a:r>
-                        <a:rPr lang="en-US" sz="1100" b="1">
+                        <a:rPr lang="en-US" sz="1100" b="1" dirty="0">
                           <a:solidFill>
                             <a:srgbClr val="000000"/>
                           </a:solidFill>
@@ -4781,9 +5018,9 @@
                           <a:ea typeface="Times New Roman" panose="02020603050405020304" pitchFamily="18" charset="0"/>
                           <a:cs typeface="Times New Roman" panose="02020603050405020304" pitchFamily="18" charset="0"/>
                         </a:rPr>
-                        <a:t>Wait until Vsync</a:t>
+                        <a:t>Trigger</a:t>
                       </a:r>
-                      <a:endParaRPr lang="en-US" sz="1100">
+                      <a:endParaRPr lang="en-US" sz="1100" dirty="0">
                         <a:solidFill>
                           <a:srgbClr val="000000"/>
                         </a:solidFill>
@@ -4908,7 +5145,7 @@
                     </a:solidFill>
                   </a:tcPr>
                 </a:tc>
-                <a:tc gridSpan="5">
+                <a:tc>
                   <a:txBody>
                     <a:bodyPr/>
                     <a:lstStyle/>
@@ -4934,8 +5171,80 @@
                           <a:ea typeface="Times New Roman" panose="02020603050405020304" pitchFamily="18" charset="0"/>
                           <a:cs typeface="Times New Roman" panose="02020603050405020304" pitchFamily="18" charset="0"/>
                         </a:rPr>
-                        <a:t> </a:t>
+                        <a:t>Action </a:t>
                       </a:r>
+                    </a:p>
+                  </a:txBody>
+                  <a:tcPr marL="68580" marR="68580" marT="0" marB="0">
+                    <a:lnL w="12700" cap="flat" cmpd="sng" algn="ctr">
+                      <a:solidFill>
+                        <a:srgbClr val="666666"/>
+                      </a:solidFill>
+                      <a:prstDash val="solid"/>
+                      <a:round/>
+                      <a:headEnd type="none" w="med" len="med"/>
+                      <a:tailEnd type="none" w="med" len="med"/>
+                    </a:lnL>
+                    <a:lnR w="12700" cap="flat" cmpd="sng" algn="ctr">
+                      <a:solidFill>
+                        <a:srgbClr val="666666"/>
+                      </a:solidFill>
+                      <a:prstDash val="solid"/>
+                      <a:round/>
+                      <a:headEnd type="none" w="med" len="med"/>
+                      <a:tailEnd type="none" w="med" len="med"/>
+                    </a:lnR>
+                    <a:lnT w="12700" cap="flat" cmpd="sng" algn="ctr">
+                      <a:solidFill>
+                        <a:srgbClr val="666666"/>
+                      </a:solidFill>
+                      <a:prstDash val="solid"/>
+                      <a:round/>
+                      <a:headEnd type="none" w="med" len="med"/>
+                      <a:tailEnd type="none" w="med" len="med"/>
+                    </a:lnT>
+                    <a:lnB w="12700" cap="flat" cmpd="sng" algn="ctr">
+                      <a:solidFill>
+                        <a:srgbClr val="666666"/>
+                      </a:solidFill>
+                      <a:prstDash val="solid"/>
+                      <a:round/>
+                      <a:headEnd type="none" w="med" len="med"/>
+                      <a:tailEnd type="none" w="med" len="med"/>
+                    </a:lnB>
+                    <a:solidFill>
+                      <a:schemeClr val="accent2">
+                        <a:lumMod val="20000"/>
+                        <a:lumOff val="80000"/>
+                      </a:schemeClr>
+                    </a:solidFill>
+                  </a:tcPr>
+                </a:tc>
+                <a:tc gridSpan="4">
+                  <a:txBody>
+                    <a:bodyPr/>
+                    <a:lstStyle/>
+                    <a:p>
+                      <a:pPr marL="0" marR="0" algn="ctr">
+                        <a:lnSpc>
+                          <a:spcPct val="105000"/>
+                        </a:lnSpc>
+                        <a:spcBef>
+                          <a:spcPts val="0"/>
+                        </a:spcBef>
+                        <a:spcAft>
+                          <a:spcPts val="0"/>
+                        </a:spcAft>
+                      </a:pPr>
+                      <a:endParaRPr lang="en-US" sz="1100" dirty="0">
+                        <a:solidFill>
+                          <a:srgbClr val="000000"/>
+                        </a:solidFill>
+                        <a:effectLst/>
+                        <a:latin typeface="Calibri" panose="020F0502020204030204" pitchFamily="34" charset="0"/>
+                        <a:ea typeface="Times New Roman" panose="02020603050405020304" pitchFamily="18" charset="0"/>
+                        <a:cs typeface="Times New Roman" panose="02020603050405020304" pitchFamily="18" charset="0"/>
+                      </a:endParaRPr>
                     </a:p>
                   </a:txBody>
                   <a:tcPr marL="68580" marR="68580" marT="0" marB="0">
@@ -4985,40 +5294,207 @@
                     <a:bodyPr/>
                     <a:lstStyle/>
                     <a:p>
-                      <a:endParaRPr lang="en-US"/>
+                      <a:pPr marL="0" marR="0" algn="ctr">
+                        <a:lnSpc>
+                          <a:spcPct val="105000"/>
+                        </a:lnSpc>
+                        <a:spcBef>
+                          <a:spcPts val="0"/>
+                        </a:spcBef>
+                        <a:spcAft>
+                          <a:spcPts val="0"/>
+                        </a:spcAft>
+                      </a:pPr>
+                      <a:endParaRPr lang="en-US" sz="1100" dirty="0">
+                        <a:solidFill>
+                          <a:srgbClr val="000000"/>
+                        </a:solidFill>
+                        <a:effectLst/>
+                        <a:latin typeface="Calibri" panose="020F0502020204030204" pitchFamily="34" charset="0"/>
+                        <a:ea typeface="Times New Roman" panose="02020603050405020304" pitchFamily="18" charset="0"/>
+                        <a:cs typeface="Times New Roman" panose="02020603050405020304" pitchFamily="18" charset="0"/>
+                      </a:endParaRPr>
                     </a:p>
                   </a:txBody>
-                  <a:tcPr/>
+                  <a:tcPr marL="68580" marR="68580" marT="0" marB="0">
+                    <a:lnL w="12700" cap="flat" cmpd="sng" algn="ctr">
+                      <a:solidFill>
+                        <a:srgbClr val="666666"/>
+                      </a:solidFill>
+                      <a:prstDash val="solid"/>
+                      <a:round/>
+                      <a:headEnd type="none" w="med" len="med"/>
+                      <a:tailEnd type="none" w="med" len="med"/>
+                    </a:lnL>
+                    <a:lnR w="12700" cap="flat" cmpd="sng" algn="ctr">
+                      <a:solidFill>
+                        <a:srgbClr val="666666"/>
+                      </a:solidFill>
+                      <a:prstDash val="solid"/>
+                      <a:round/>
+                      <a:headEnd type="none" w="med" len="med"/>
+                      <a:tailEnd type="none" w="med" len="med"/>
+                    </a:lnR>
+                    <a:lnT w="12700" cap="flat" cmpd="sng" algn="ctr">
+                      <a:solidFill>
+                        <a:srgbClr val="666666"/>
+                      </a:solidFill>
+                      <a:prstDash val="solid"/>
+                      <a:round/>
+                      <a:headEnd type="none" w="med" len="med"/>
+                      <a:tailEnd type="none" w="med" len="med"/>
+                    </a:lnT>
+                    <a:lnB w="12700" cap="flat" cmpd="sng" algn="ctr">
+                      <a:solidFill>
+                        <a:srgbClr val="666666"/>
+                      </a:solidFill>
+                      <a:prstDash val="solid"/>
+                      <a:round/>
+                      <a:headEnd type="none" w="med" len="med"/>
+                      <a:tailEnd type="none" w="med" len="med"/>
+                    </a:lnB>
+                    <a:solidFill>
+                      <a:srgbClr val="F2F2F2"/>
+                    </a:solidFill>
+                  </a:tcPr>
                 </a:tc>
                 <a:tc hMerge="1">
                   <a:txBody>
                     <a:bodyPr/>
                     <a:lstStyle/>
                     <a:p>
-                      <a:endParaRPr lang="en-US"/>
+                      <a:pPr marL="0" marR="0" algn="ctr">
+                        <a:lnSpc>
+                          <a:spcPct val="105000"/>
+                        </a:lnSpc>
+                        <a:spcBef>
+                          <a:spcPts val="0"/>
+                        </a:spcBef>
+                        <a:spcAft>
+                          <a:spcPts val="0"/>
+                        </a:spcAft>
+                      </a:pPr>
+                      <a:endParaRPr lang="en-US" sz="1100" dirty="0">
+                        <a:solidFill>
+                          <a:srgbClr val="000000"/>
+                        </a:solidFill>
+                        <a:effectLst/>
+                        <a:latin typeface="Calibri" panose="020F0502020204030204" pitchFamily="34" charset="0"/>
+                        <a:ea typeface="Times New Roman" panose="02020603050405020304" pitchFamily="18" charset="0"/>
+                        <a:cs typeface="Times New Roman" panose="02020603050405020304" pitchFamily="18" charset="0"/>
+                      </a:endParaRPr>
                     </a:p>
                   </a:txBody>
-                  <a:tcPr/>
+                  <a:tcPr marL="68580" marR="68580" marT="0" marB="0">
+                    <a:lnL w="12700" cap="flat" cmpd="sng" algn="ctr">
+                      <a:solidFill>
+                        <a:srgbClr val="666666"/>
+                      </a:solidFill>
+                      <a:prstDash val="solid"/>
+                      <a:round/>
+                      <a:headEnd type="none" w="med" len="med"/>
+                      <a:tailEnd type="none" w="med" len="med"/>
+                    </a:lnL>
+                    <a:lnR w="12700" cap="flat" cmpd="sng" algn="ctr">
+                      <a:solidFill>
+                        <a:srgbClr val="666666"/>
+                      </a:solidFill>
+                      <a:prstDash val="solid"/>
+                      <a:round/>
+                      <a:headEnd type="none" w="med" len="med"/>
+                      <a:tailEnd type="none" w="med" len="med"/>
+                    </a:lnR>
+                    <a:lnT w="12700" cap="flat" cmpd="sng" algn="ctr">
+                      <a:solidFill>
+                        <a:srgbClr val="666666"/>
+                      </a:solidFill>
+                      <a:prstDash val="solid"/>
+                      <a:round/>
+                      <a:headEnd type="none" w="med" len="med"/>
+                      <a:tailEnd type="none" w="med" len="med"/>
+                    </a:lnT>
+                    <a:lnB w="12700" cap="flat" cmpd="sng" algn="ctr">
+                      <a:solidFill>
+                        <a:srgbClr val="666666"/>
+                      </a:solidFill>
+                      <a:prstDash val="solid"/>
+                      <a:round/>
+                      <a:headEnd type="none" w="med" len="med"/>
+                      <a:tailEnd type="none" w="med" len="med"/>
+                    </a:lnB>
+                    <a:solidFill>
+                      <a:srgbClr val="F2F2F2"/>
+                    </a:solidFill>
+                  </a:tcPr>
                 </a:tc>
                 <a:tc hMerge="1">
                   <a:txBody>
                     <a:bodyPr/>
                     <a:lstStyle/>
                     <a:p>
-                      <a:endParaRPr lang="en-US"/>
+                      <a:pPr marL="0" marR="0" algn="ctr">
+                        <a:lnSpc>
+                          <a:spcPct val="105000"/>
+                        </a:lnSpc>
+                        <a:spcBef>
+                          <a:spcPts val="0"/>
+                        </a:spcBef>
+                        <a:spcAft>
+                          <a:spcPts val="0"/>
+                        </a:spcAft>
+                      </a:pPr>
+                      <a:endParaRPr lang="en-US" sz="1100" dirty="0">
+                        <a:solidFill>
+                          <a:srgbClr val="000000"/>
+                        </a:solidFill>
+                        <a:effectLst/>
+                        <a:latin typeface="Calibri" panose="020F0502020204030204" pitchFamily="34" charset="0"/>
+                        <a:ea typeface="Times New Roman" panose="02020603050405020304" pitchFamily="18" charset="0"/>
+                        <a:cs typeface="Times New Roman" panose="02020603050405020304" pitchFamily="18" charset="0"/>
+                      </a:endParaRPr>
                     </a:p>
                   </a:txBody>
-                  <a:tcPr/>
-                </a:tc>
-                <a:tc hMerge="1">
-                  <a:txBody>
-                    <a:bodyPr/>
-                    <a:lstStyle/>
-                    <a:p>
-                      <a:endParaRPr lang="en-US"/>
-                    </a:p>
-                  </a:txBody>
-                  <a:tcPr/>
+                  <a:tcPr marL="68580" marR="68580" marT="0" marB="0">
+                    <a:lnL w="12700" cap="flat" cmpd="sng" algn="ctr">
+                      <a:solidFill>
+                        <a:srgbClr val="666666"/>
+                      </a:solidFill>
+                      <a:prstDash val="solid"/>
+                      <a:round/>
+                      <a:headEnd type="none" w="med" len="med"/>
+                      <a:tailEnd type="none" w="med" len="med"/>
+                    </a:lnL>
+                    <a:lnR w="12700" cap="flat" cmpd="sng" algn="ctr">
+                      <a:solidFill>
+                        <a:srgbClr val="666666"/>
+                      </a:solidFill>
+                      <a:prstDash val="solid"/>
+                      <a:round/>
+                      <a:headEnd type="none" w="med" len="med"/>
+                      <a:tailEnd type="none" w="med" len="med"/>
+                    </a:lnR>
+                    <a:lnT w="12700" cap="flat" cmpd="sng" algn="ctr">
+                      <a:solidFill>
+                        <a:srgbClr val="666666"/>
+                      </a:solidFill>
+                      <a:prstDash val="solid"/>
+                      <a:round/>
+                      <a:headEnd type="none" w="med" len="med"/>
+                      <a:tailEnd type="none" w="med" len="med"/>
+                    </a:lnT>
+                    <a:lnB w="12700" cap="flat" cmpd="sng" algn="ctr">
+                      <a:solidFill>
+                        <a:srgbClr val="666666"/>
+                      </a:solidFill>
+                      <a:prstDash val="solid"/>
+                      <a:round/>
+                      <a:headEnd type="none" w="med" len="med"/>
+                      <a:tailEnd type="none" w="med" len="med"/>
+                    </a:lnB>
+                    <a:solidFill>
+                      <a:srgbClr val="F2F2F2"/>
+                    </a:solidFill>
+                  </a:tcPr>
                 </a:tc>
                 <a:extLst>
                   <a:ext uri="{0D108BD9-81ED-4DB2-BD59-A6C34878D82A}">

</xml_diff>